<commit_message>
proj3 status report stuff
</commit_message>
<xml_diff>
--- a/cs418presentation2.pptx
+++ b/cs418presentation2.pptx
@@ -6,12 +6,12 @@
   </p:sldMasterIdLst>
   <p:sldIdLst>
     <p:sldId id="256" r:id="rId2"/>
-    <p:sldId id="257" r:id="rId3"/>
-    <p:sldId id="262" r:id="rId4"/>
-    <p:sldId id="258" r:id="rId5"/>
-    <p:sldId id="259" r:id="rId6"/>
-    <p:sldId id="260" r:id="rId7"/>
-    <p:sldId id="261" r:id="rId8"/>
+    <p:sldId id="258" r:id="rId3"/>
+    <p:sldId id="259" r:id="rId4"/>
+    <p:sldId id="260" r:id="rId5"/>
+    <p:sldId id="262" r:id="rId6"/>
+    <p:sldId id="264" r:id="rId7"/>
+    <p:sldId id="265" r:id="rId8"/>
   </p:sldIdLst>
   <p:sldSz cx="9144000" cy="6858000" type="screen4x3"/>
   <p:notesSz cx="6858000" cy="9144000"/>
@@ -294,7 +294,7 @@
           <a:p>
             <a:fld id="{72B107F0-9212-9744-B09A-7924AED84175}" type="datetimeFigureOut">
               <a:rPr lang="en-US" smtClean="0"/>
-              <a:t>2/25/14</a:t>
+              <a:t>3/24/14</a:t>
             </a:fld>
             <a:endParaRPr lang="en-US"/>
           </a:p>
@@ -464,7 +464,7 @@
           <a:p>
             <a:fld id="{72B107F0-9212-9744-B09A-7924AED84175}" type="datetimeFigureOut">
               <a:rPr lang="en-US" smtClean="0"/>
-              <a:t>2/25/14</a:t>
+              <a:t>3/24/14</a:t>
             </a:fld>
             <a:endParaRPr lang="en-US"/>
           </a:p>
@@ -644,7 +644,7 @@
           <a:p>
             <a:fld id="{72B107F0-9212-9744-B09A-7924AED84175}" type="datetimeFigureOut">
               <a:rPr lang="en-US" smtClean="0"/>
-              <a:t>2/25/14</a:t>
+              <a:t>3/24/14</a:t>
             </a:fld>
             <a:endParaRPr lang="en-US"/>
           </a:p>
@@ -814,7 +814,7 @@
           <a:p>
             <a:fld id="{72B107F0-9212-9744-B09A-7924AED84175}" type="datetimeFigureOut">
               <a:rPr lang="en-US" smtClean="0"/>
-              <a:t>2/25/14</a:t>
+              <a:t>3/24/14</a:t>
             </a:fld>
             <a:endParaRPr lang="en-US"/>
           </a:p>
@@ -1060,7 +1060,7 @@
           <a:p>
             <a:fld id="{72B107F0-9212-9744-B09A-7924AED84175}" type="datetimeFigureOut">
               <a:rPr lang="en-US" smtClean="0"/>
-              <a:t>2/25/14</a:t>
+              <a:t>3/24/14</a:t>
             </a:fld>
             <a:endParaRPr lang="en-US"/>
           </a:p>
@@ -1348,7 +1348,7 @@
           <a:p>
             <a:fld id="{72B107F0-9212-9744-B09A-7924AED84175}" type="datetimeFigureOut">
               <a:rPr lang="en-US" smtClean="0"/>
-              <a:t>2/25/14</a:t>
+              <a:t>3/24/14</a:t>
             </a:fld>
             <a:endParaRPr lang="en-US"/>
           </a:p>
@@ -1770,7 +1770,7 @@
           <a:p>
             <a:fld id="{72B107F0-9212-9744-B09A-7924AED84175}" type="datetimeFigureOut">
               <a:rPr lang="en-US" smtClean="0"/>
-              <a:t>2/25/14</a:t>
+              <a:t>3/24/14</a:t>
             </a:fld>
             <a:endParaRPr lang="en-US"/>
           </a:p>
@@ -1888,7 +1888,7 @@
           <a:p>
             <a:fld id="{72B107F0-9212-9744-B09A-7924AED84175}" type="datetimeFigureOut">
               <a:rPr lang="en-US" smtClean="0"/>
-              <a:t>2/25/14</a:t>
+              <a:t>3/24/14</a:t>
             </a:fld>
             <a:endParaRPr lang="en-US"/>
           </a:p>
@@ -1983,7 +1983,7 @@
           <a:p>
             <a:fld id="{72B107F0-9212-9744-B09A-7924AED84175}" type="datetimeFigureOut">
               <a:rPr lang="en-US" smtClean="0"/>
-              <a:t>2/25/14</a:t>
+              <a:t>3/24/14</a:t>
             </a:fld>
             <a:endParaRPr lang="en-US"/>
           </a:p>
@@ -2260,7 +2260,7 @@
           <a:p>
             <a:fld id="{72B107F0-9212-9744-B09A-7924AED84175}" type="datetimeFigureOut">
               <a:rPr lang="en-US" smtClean="0"/>
-              <a:t>2/25/14</a:t>
+              <a:t>3/24/14</a:t>
             </a:fld>
             <a:endParaRPr lang="en-US"/>
           </a:p>
@@ -2513,7 +2513,7 @@
           <a:p>
             <a:fld id="{72B107F0-9212-9744-B09A-7924AED84175}" type="datetimeFigureOut">
               <a:rPr lang="en-US" smtClean="0"/>
-              <a:t>2/25/14</a:t>
+              <a:t>3/24/14</a:t>
             </a:fld>
             <a:endParaRPr lang="en-US"/>
           </a:p>
@@ -2726,7 +2726,7 @@
           <a:p>
             <a:fld id="{72B107F0-9212-9744-B09A-7924AED84175}" type="datetimeFigureOut">
               <a:rPr lang="en-US" smtClean="0"/>
-              <a:t>2/25/14</a:t>
+              <a:t>3/24/14</a:t>
             </a:fld>
             <a:endParaRPr lang="en-US"/>
           </a:p>
@@ -3191,7 +3191,23 @@
                   <a:srgbClr val="FFFFFF"/>
                 </a:solidFill>
               </a:rPr>
-              <a:t>Project 2: </a:t>
+              <a:t>Project </a:t>
+            </a:r>
+            <a:r>
+              <a:rPr lang="en-US" sz="6600" dirty="0" smtClean="0">
+                <a:solidFill>
+                  <a:srgbClr val="FFFFFF"/>
+                </a:solidFill>
+              </a:rPr>
+              <a:t>3: </a:t>
+            </a:r>
+            <a:r>
+              <a:rPr lang="en-US" sz="6600" dirty="0" smtClean="0">
+                <a:solidFill>
+                  <a:srgbClr val="FFFFFF"/>
+                </a:solidFill>
+              </a:rPr>
+              <a:t/>
             </a:r>
             <a:br>
               <a:rPr lang="en-US" sz="6600" dirty="0" smtClean="0">
@@ -3322,47 +3338,9 @@
           <a:chExt cx="0" cy="0"/>
         </a:xfrm>
       </p:grpSpPr>
-      <p:sp>
-        <p:nvSpPr>
-          <p:cNvPr id="2" name="Title 1"/>
-          <p:cNvSpPr>
-            <a:spLocks noGrp="1"/>
-          </p:cNvSpPr>
-          <p:nvPr>
-            <p:ph type="title"/>
-          </p:nvPr>
-        </p:nvSpPr>
-        <p:spPr>
-          <a:xfrm>
-            <a:off x="457200" y="2830513"/>
-            <a:ext cx="8229600" cy="1143000"/>
-          </a:xfrm>
-        </p:spPr>
-        <p:txBody>
-          <a:bodyPr>
-            <a:noAutofit/>
-          </a:bodyPr>
-          <a:lstStyle/>
-          <a:p>
-            <a:r>
-              <a:rPr lang="en-US" sz="13800" dirty="0" smtClean="0">
-                <a:solidFill>
-                  <a:srgbClr val="4EC5C1"/>
-                </a:solidFill>
-              </a:rPr>
-              <a:t>ROLES</a:t>
-            </a:r>
-            <a:endParaRPr lang="en-US" sz="13800" dirty="0">
-              <a:solidFill>
-                <a:srgbClr val="4EC5C1"/>
-              </a:solidFill>
-            </a:endParaRPr>
-          </a:p>
-        </p:txBody>
-      </p:sp>
       <p:pic>
         <p:nvPicPr>
-          <p:cNvPr id="4" name="Picture 3" descr="mockup1.png"/>
+          <p:cNvPr id="4" name="Picture 3" descr="Screen Shot 2014-03-25 at 12.18.45 AM.png"/>
           <p:cNvPicPr>
             <a:picLocks noChangeAspect="1"/>
           </p:cNvPicPr>
@@ -3382,8 +3360,8 @@
         </p:blipFill>
         <p:spPr>
           <a:xfrm>
-            <a:off x="0" y="0"/>
-            <a:ext cx="9144000" cy="6858000"/>
+            <a:off x="0" y="577785"/>
+            <a:ext cx="9144000" cy="4615847"/>
           </a:xfrm>
           <a:prstGeom prst="rect">
             <a:avLst/>
@@ -3392,14 +3370,53 @@
       </p:pic>
       <p:sp>
         <p:nvSpPr>
-          <p:cNvPr id="5" name="Rectangle 4"/>
-          <p:cNvSpPr/>
+          <p:cNvPr id="5" name="Title 1"/>
+          <p:cNvSpPr>
+            <a:spLocks noGrp="1"/>
+          </p:cNvSpPr>
+          <p:nvPr>
+            <p:ph type="title"/>
+          </p:nvPr>
+        </p:nvSpPr>
+        <p:spPr>
+          <a:xfrm>
+            <a:off x="310144" y="-230852"/>
+            <a:ext cx="6922168" cy="1143000"/>
+          </a:xfrm>
+        </p:spPr>
+        <p:txBody>
+          <a:bodyPr>
+            <a:noAutofit/>
+          </a:bodyPr>
+          <a:lstStyle/>
+          <a:p>
+            <a:pPr algn="l"/>
+            <a:r>
+              <a:rPr lang="en-US" sz="4800" dirty="0" smtClean="0">
+                <a:solidFill>
+                  <a:srgbClr val="4EC5C1"/>
+                </a:solidFill>
+              </a:rPr>
+              <a:t>USER REGISTRATION</a:t>
+            </a:r>
+            <a:endParaRPr lang="en-US" sz="4800" dirty="0">
+              <a:solidFill>
+                <a:srgbClr val="4EC5C1"/>
+              </a:solidFill>
+            </a:endParaRPr>
+          </a:p>
+        </p:txBody>
+      </p:sp>
+      <p:sp>
+        <p:nvSpPr>
+          <p:cNvPr id="6" name="TextBox 5"/>
+          <p:cNvSpPr txBox="1"/>
           <p:nvPr/>
         </p:nvSpPr>
         <p:spPr>
           <a:xfrm>
-            <a:off x="3905250" y="2936875"/>
-            <a:ext cx="3286125" cy="714375"/>
+            <a:off x="2673620" y="5307271"/>
+            <a:ext cx="2620210" cy="646331"/>
           </a:xfrm>
           <a:prstGeom prst="rect">
             <a:avLst/>
@@ -3407,38 +3424,209 @@
           <a:noFill/>
           <a:ln>
             <a:solidFill>
-              <a:srgbClr val="4EC5C1"/>
+              <a:srgbClr val="262626"/>
             </a:solidFill>
           </a:ln>
-          <a:effectLst/>
+        </p:spPr>
+        <p:txBody>
+          <a:bodyPr wrap="square" rtlCol="0">
+            <a:spAutoFit/>
+          </a:bodyPr>
+          <a:lstStyle/>
+          <a:p>
+            <a:pPr algn="ctr"/>
+            <a:r>
+              <a:rPr lang="en-US" dirty="0" smtClean="0"/>
+              <a:t>User can pick out his or her username</a:t>
+            </a:r>
+            <a:endParaRPr lang="en-US" dirty="0"/>
+          </a:p>
+        </p:txBody>
+      </p:sp>
+      <p:sp>
+        <p:nvSpPr>
+          <p:cNvPr id="7" name="TextBox 6"/>
+          <p:cNvSpPr txBox="1"/>
+          <p:nvPr/>
+        </p:nvSpPr>
+        <p:spPr>
+          <a:xfrm>
+            <a:off x="5620020" y="5307270"/>
+            <a:ext cx="2855559" cy="923330"/>
+          </a:xfrm>
+          <a:prstGeom prst="rect">
+            <a:avLst/>
+          </a:prstGeom>
+          <a:noFill/>
+          <a:ln>
+            <a:solidFill>
+              <a:srgbClr val="262626"/>
+            </a:solidFill>
+          </a:ln>
+        </p:spPr>
+        <p:txBody>
+          <a:bodyPr wrap="square" rtlCol="0">
+            <a:spAutoFit/>
+          </a:bodyPr>
+          <a:lstStyle/>
+          <a:p>
+            <a:pPr algn="ctr"/>
+            <a:r>
+              <a:rPr lang="en-US" dirty="0" smtClean="0"/>
+              <a:t>JS script to check if the email is valid (CS email and generally valid form)</a:t>
+            </a:r>
+            <a:endParaRPr lang="en-US" dirty="0"/>
+          </a:p>
+        </p:txBody>
+      </p:sp>
+      <p:sp>
+        <p:nvSpPr>
+          <p:cNvPr id="8" name="TextBox 7"/>
+          <p:cNvSpPr txBox="1"/>
+          <p:nvPr/>
+        </p:nvSpPr>
+        <p:spPr>
+          <a:xfrm>
+            <a:off x="406399" y="6212248"/>
+            <a:ext cx="2620210" cy="369332"/>
+          </a:xfrm>
+          <a:prstGeom prst="rect">
+            <a:avLst/>
+          </a:prstGeom>
+          <a:noFill/>
+          <a:ln>
+            <a:solidFill>
+              <a:srgbClr val="262626"/>
+            </a:solidFill>
+          </a:ln>
+        </p:spPr>
+        <p:txBody>
+          <a:bodyPr wrap="square" rtlCol="0">
+            <a:spAutoFit/>
+          </a:bodyPr>
+          <a:lstStyle/>
+          <a:p>
+            <a:pPr algn="ctr"/>
+            <a:r>
+              <a:rPr lang="en-US" dirty="0" smtClean="0"/>
+              <a:t>Options for email</a:t>
+            </a:r>
+            <a:endParaRPr lang="en-US" dirty="0"/>
+          </a:p>
+        </p:txBody>
+      </p:sp>
+      <p:cxnSp>
+        <p:nvCxnSpPr>
+          <p:cNvPr id="10" name="Straight Arrow Connector 9"/>
+          <p:cNvCxnSpPr/>
+          <p:nvPr/>
+        </p:nvCxnSpPr>
+        <p:spPr>
+          <a:xfrm flipV="1">
+            <a:off x="3235093" y="2219158"/>
+            <a:ext cx="0" cy="3088112"/>
+          </a:xfrm>
+          <a:prstGeom prst="straightConnector1">
+            <a:avLst/>
+          </a:prstGeom>
+          <a:ln>
+            <a:solidFill>
+              <a:srgbClr val="262626"/>
+            </a:solidFill>
+            <a:tailEnd type="arrow"/>
+          </a:ln>
         </p:spPr>
         <p:style>
-          <a:lnRef idx="1">
+          <a:lnRef idx="2">
             <a:schemeClr val="accent1"/>
           </a:lnRef>
-          <a:fillRef idx="3">
+          <a:fillRef idx="0">
             <a:schemeClr val="accent1"/>
           </a:fillRef>
-          <a:effectRef idx="2">
+          <a:effectRef idx="1">
             <a:schemeClr val="accent1"/>
           </a:effectRef>
           <a:fontRef idx="minor">
-            <a:schemeClr val="lt1"/>
+            <a:schemeClr val="tx1"/>
           </a:fontRef>
         </p:style>
-        <p:txBody>
-          <a:bodyPr rtlCol="0" anchor="ctr"/>
-          <a:lstStyle/>
-          <a:p>
-            <a:pPr algn="ctr"/>
-            <a:endParaRPr lang="en-US"/>
-          </a:p>
-        </p:txBody>
-      </p:sp>
+      </p:cxnSp>
+      <p:cxnSp>
+        <p:nvCxnSpPr>
+          <p:cNvPr id="11" name="Straight Arrow Connector 10"/>
+          <p:cNvCxnSpPr/>
+          <p:nvPr/>
+        </p:nvCxnSpPr>
+        <p:spPr>
+          <a:xfrm flipV="1">
+            <a:off x="5833914" y="2927684"/>
+            <a:ext cx="0" cy="2379587"/>
+          </a:xfrm>
+          <a:prstGeom prst="straightConnector1">
+            <a:avLst/>
+          </a:prstGeom>
+          <a:ln>
+            <a:solidFill>
+              <a:srgbClr val="262626"/>
+            </a:solidFill>
+            <a:tailEnd type="arrow"/>
+          </a:ln>
+        </p:spPr>
+        <p:style>
+          <a:lnRef idx="2">
+            <a:schemeClr val="accent1"/>
+          </a:lnRef>
+          <a:fillRef idx="0">
+            <a:schemeClr val="accent1"/>
+          </a:fillRef>
+          <a:effectRef idx="1">
+            <a:schemeClr val="accent1"/>
+          </a:effectRef>
+          <a:fontRef idx="minor">
+            <a:schemeClr val="tx1"/>
+          </a:fontRef>
+        </p:style>
+      </p:cxnSp>
+      <p:cxnSp>
+        <p:nvCxnSpPr>
+          <p:cNvPr id="15" name="Straight Arrow Connector 14"/>
+          <p:cNvCxnSpPr/>
+          <p:nvPr/>
+        </p:nvCxnSpPr>
+        <p:spPr>
+          <a:xfrm flipV="1">
+            <a:off x="2296693" y="4050632"/>
+            <a:ext cx="0" cy="2161617"/>
+          </a:xfrm>
+          <a:prstGeom prst="straightConnector1">
+            <a:avLst/>
+          </a:prstGeom>
+          <a:ln>
+            <a:solidFill>
+              <a:srgbClr val="262626"/>
+            </a:solidFill>
+            <a:tailEnd type="arrow"/>
+          </a:ln>
+        </p:spPr>
+        <p:style>
+          <a:lnRef idx="2">
+            <a:schemeClr val="accent1"/>
+          </a:lnRef>
+          <a:fillRef idx="0">
+            <a:schemeClr val="accent1"/>
+          </a:fillRef>
+          <a:effectRef idx="1">
+            <a:schemeClr val="accent1"/>
+          </a:effectRef>
+          <a:fontRef idx="minor">
+            <a:schemeClr val="tx1"/>
+          </a:fontRef>
+        </p:style>
+      </p:cxnSp>
     </p:spTree>
     <p:extLst>
       <p:ext uri="{BB962C8B-B14F-4D97-AF65-F5344CB8AC3E}">
-        <p14:creationId xmlns:p14="http://schemas.microsoft.com/office/powerpoint/2010/main" val="1655546244"/>
+        <p14:creationId xmlns:p14="http://schemas.microsoft.com/office/powerpoint/2010/main" val="4199616216"/>
       </p:ext>
     </p:extLst>
   </p:cSld>
@@ -3448,141 +3636,9 @@
   <p:timing>
     <p:tnLst>
       <p:par>
-        <p:cTn xmlns:p14="http://schemas.microsoft.com/office/powerpoint/2010/main" id="1" dur="indefinite" restart="never" nodeType="tmRoot">
-          <p:childTnLst>
-            <p:seq concurrent="1" nextAc="seek">
-              <p:cTn id="2" dur="indefinite" nodeType="mainSeq">
-                <p:childTnLst>
-                  <p:par>
-                    <p:cTn id="3" fill="hold">
-                      <p:stCondLst>
-                        <p:cond delay="indefinite"/>
-                      </p:stCondLst>
-                      <p:childTnLst>
-                        <p:par>
-                          <p:cTn id="4" fill="hold">
-                            <p:stCondLst>
-                              <p:cond delay="0"/>
-                            </p:stCondLst>
-                            <p:childTnLst>
-                              <p:par>
-                                <p:cTn id="5" presetID="10" presetClass="entr" presetSubtype="0" fill="hold" nodeType="clickEffect">
-                                  <p:stCondLst>
-                                    <p:cond delay="0"/>
-                                  </p:stCondLst>
-                                  <p:childTnLst>
-                                    <p:set>
-                                      <p:cBhvr>
-                                        <p:cTn id="6" dur="1" fill="hold">
-                                          <p:stCondLst>
-                                            <p:cond delay="0"/>
-                                          </p:stCondLst>
-                                        </p:cTn>
-                                        <p:tgtEl>
-                                          <p:spTgt spid="4"/>
-                                        </p:tgtEl>
-                                        <p:attrNameLst>
-                                          <p:attrName>style.visibility</p:attrName>
-                                        </p:attrNameLst>
-                                      </p:cBhvr>
-                                      <p:to>
-                                        <p:strVal val="visible"/>
-                                      </p:to>
-                                    </p:set>
-                                    <p:animEffect transition="in" filter="fade">
-                                      <p:cBhvr>
-                                        <p:cTn id="7" dur="500"/>
-                                        <p:tgtEl>
-                                          <p:spTgt spid="4"/>
-                                        </p:tgtEl>
-                                      </p:cBhvr>
-                                    </p:animEffect>
-                                  </p:childTnLst>
-                                </p:cTn>
-                              </p:par>
-                            </p:childTnLst>
-                          </p:cTn>
-                        </p:par>
-                      </p:childTnLst>
-                    </p:cTn>
-                  </p:par>
-                  <p:par>
-                    <p:cTn id="8" fill="hold">
-                      <p:stCondLst>
-                        <p:cond delay="indefinite"/>
-                      </p:stCondLst>
-                      <p:childTnLst>
-                        <p:par>
-                          <p:cTn id="9" fill="hold">
-                            <p:stCondLst>
-                              <p:cond delay="0"/>
-                            </p:stCondLst>
-                            <p:childTnLst>
-                              <p:par>
-                                <p:cTn id="10" presetID="10" presetClass="entr" presetSubtype="0" fill="hold" grpId="0" nodeType="clickEffect">
-                                  <p:stCondLst>
-                                    <p:cond delay="0"/>
-                                  </p:stCondLst>
-                                  <p:childTnLst>
-                                    <p:set>
-                                      <p:cBhvr>
-                                        <p:cTn id="11" dur="1" fill="hold">
-                                          <p:stCondLst>
-                                            <p:cond delay="0"/>
-                                          </p:stCondLst>
-                                        </p:cTn>
-                                        <p:tgtEl>
-                                          <p:spTgt spid="5"/>
-                                        </p:tgtEl>
-                                        <p:attrNameLst>
-                                          <p:attrName>style.visibility</p:attrName>
-                                        </p:attrNameLst>
-                                      </p:cBhvr>
-                                      <p:to>
-                                        <p:strVal val="visible"/>
-                                      </p:to>
-                                    </p:set>
-                                    <p:animEffect transition="in" filter="fade">
-                                      <p:cBhvr>
-                                        <p:cTn id="12" dur="500"/>
-                                        <p:tgtEl>
-                                          <p:spTgt spid="5"/>
-                                        </p:tgtEl>
-                                      </p:cBhvr>
-                                    </p:animEffect>
-                                  </p:childTnLst>
-                                </p:cTn>
-                              </p:par>
-                            </p:childTnLst>
-                          </p:cTn>
-                        </p:par>
-                      </p:childTnLst>
-                    </p:cTn>
-                  </p:par>
-                </p:childTnLst>
-              </p:cTn>
-              <p:prevCondLst>
-                <p:cond evt="onPrev" delay="0">
-                  <p:tgtEl>
-                    <p:sldTgt/>
-                  </p:tgtEl>
-                </p:cond>
-              </p:prevCondLst>
-              <p:nextCondLst>
-                <p:cond evt="onNext" delay="0">
-                  <p:tgtEl>
-                    <p:sldTgt/>
-                  </p:tgtEl>
-                </p:cond>
-              </p:nextCondLst>
-            </p:seq>
-          </p:childTnLst>
-        </p:cTn>
+        <p:cTn xmlns:p14="http://schemas.microsoft.com/office/powerpoint/2010/main" id="1" dur="indefinite" restart="never" nodeType="tmRoot"/>
       </p:par>
     </p:tnLst>
-    <p:bldLst>
-      <p:bldP spid="5" grpId="0" animBg="1"/>
-    </p:bldLst>
   </p:timing>
 </p:sld>
 </file>
@@ -3606,7 +3662,7 @@
       </p:grpSpPr>
       <p:pic>
         <p:nvPicPr>
-          <p:cNvPr id="5" name="Picture 4" descr="mockup2.png"/>
+          <p:cNvPr id="4" name="Picture 3" descr="Screen Shot 2014-03-25 at 12.27.18 AM.png"/>
           <p:cNvPicPr>
             <a:picLocks noChangeAspect="1"/>
           </p:cNvPicPr>
@@ -3626,8 +3682,8 @@
         </p:blipFill>
         <p:spPr>
           <a:xfrm>
-            <a:off x="0" y="0"/>
-            <a:ext cx="9144000" cy="6858000"/>
+            <a:off x="0" y="718548"/>
+            <a:ext cx="9144000" cy="4172085"/>
           </a:xfrm>
           <a:prstGeom prst="rect">
             <a:avLst/>
@@ -3636,14 +3692,69 @@
       </p:pic>
       <p:sp>
         <p:nvSpPr>
+          <p:cNvPr id="5" name="Title 1"/>
+          <p:cNvSpPr txBox="1">
+            <a:spLocks/>
+          </p:cNvSpPr>
+          <p:nvPr/>
+        </p:nvSpPr>
+        <p:spPr>
+          <a:xfrm>
+            <a:off x="310144" y="-97172"/>
+            <a:ext cx="6922168" cy="1143000"/>
+          </a:xfrm>
+          <a:prstGeom prst="rect">
+            <a:avLst/>
+          </a:prstGeom>
+        </p:spPr>
+        <p:txBody>
+          <a:bodyPr vert="horz" lIns="91440" tIns="45720" rIns="91440" bIns="45720" rtlCol="0" anchor="ctr">
+            <a:noAutofit/>
+          </a:bodyPr>
+          <a:lstStyle>
+            <a:lvl1pPr algn="ctr" defTabSz="457200" rtl="0" eaLnBrk="1" latinLnBrk="0" hangingPunct="1">
+              <a:spcBef>
+                <a:spcPct val="0"/>
+              </a:spcBef>
+              <a:buNone/>
+              <a:defRPr sz="4400" kern="1200">
+                <a:solidFill>
+                  <a:schemeClr val="tx1"/>
+                </a:solidFill>
+                <a:latin typeface="+mj-lt"/>
+                <a:ea typeface="+mj-ea"/>
+                <a:cs typeface="+mj-cs"/>
+              </a:defRPr>
+            </a:lvl1pPr>
+          </a:lstStyle>
+          <a:p>
+            <a:pPr algn="l"/>
+            <a:r>
+              <a:rPr lang="en-US" sz="4800" dirty="0" smtClean="0">
+                <a:solidFill>
+                  <a:srgbClr val="4EC5C1"/>
+                </a:solidFill>
+              </a:rPr>
+              <a:t>FORGOT PASSWORD</a:t>
+            </a:r>
+            <a:endParaRPr lang="en-US" sz="4800" dirty="0">
+              <a:solidFill>
+                <a:srgbClr val="4EC5C1"/>
+              </a:solidFill>
+            </a:endParaRPr>
+          </a:p>
+        </p:txBody>
+      </p:sp>
+      <p:sp>
+        <p:nvSpPr>
           <p:cNvPr id="6" name="Rectangle 5"/>
           <p:cNvSpPr/>
           <p:nvPr/>
         </p:nvSpPr>
         <p:spPr>
           <a:xfrm>
-            <a:off x="3905250" y="2936875"/>
-            <a:ext cx="936625" cy="333375"/>
+            <a:off x="3823368" y="3863469"/>
+            <a:ext cx="1524000" cy="294106"/>
           </a:xfrm>
           <a:prstGeom prst="rect">
             <a:avLst/>
@@ -3651,10 +3762,9 @@
           <a:noFill/>
           <a:ln>
             <a:solidFill>
-              <a:srgbClr val="4EC5C1"/>
+              <a:srgbClr val="262626"/>
             </a:solidFill>
           </a:ln>
-          <a:effectLst/>
         </p:spPr>
         <p:style>
           <a:lnRef idx="1">
@@ -3679,10 +3789,83 @@
           </a:p>
         </p:txBody>
       </p:sp>
+      <p:sp>
+        <p:nvSpPr>
+          <p:cNvPr id="7" name="TextBox 6"/>
+          <p:cNvSpPr txBox="1"/>
+          <p:nvPr/>
+        </p:nvSpPr>
+        <p:spPr>
+          <a:xfrm>
+            <a:off x="2451760" y="5293891"/>
+            <a:ext cx="4291263" cy="923330"/>
+          </a:xfrm>
+          <a:prstGeom prst="rect">
+            <a:avLst/>
+          </a:prstGeom>
+          <a:noFill/>
+          <a:ln>
+            <a:solidFill>
+              <a:srgbClr val="262626"/>
+            </a:solidFill>
+          </a:ln>
+        </p:spPr>
+        <p:txBody>
+          <a:bodyPr wrap="square" rtlCol="0">
+            <a:spAutoFit/>
+          </a:bodyPr>
+          <a:lstStyle/>
+          <a:p>
+            <a:pPr algn="ctr"/>
+            <a:r>
+              <a:rPr lang="en-US" dirty="0" smtClean="0"/>
+              <a:t>When a user forgets his/her password, the server send out an email to the user with a link to set new password</a:t>
+            </a:r>
+          </a:p>
+        </p:txBody>
+      </p:sp>
+      <p:cxnSp>
+        <p:nvCxnSpPr>
+          <p:cNvPr id="8" name="Straight Arrow Connector 7"/>
+          <p:cNvCxnSpPr>
+            <a:stCxn id="7" idx="0"/>
+          </p:cNvCxnSpPr>
+          <p:nvPr/>
+        </p:nvCxnSpPr>
+        <p:spPr>
+          <a:xfrm flipH="1" flipV="1">
+            <a:off x="4566650" y="4157576"/>
+            <a:ext cx="30742" cy="1136315"/>
+          </a:xfrm>
+          <a:prstGeom prst="straightConnector1">
+            <a:avLst/>
+          </a:prstGeom>
+          <a:ln>
+            <a:solidFill>
+              <a:srgbClr val="262626"/>
+            </a:solidFill>
+            <a:tailEnd type="arrow"/>
+          </a:ln>
+        </p:spPr>
+        <p:style>
+          <a:lnRef idx="2">
+            <a:schemeClr val="accent1"/>
+          </a:lnRef>
+          <a:fillRef idx="0">
+            <a:schemeClr val="accent1"/>
+          </a:fillRef>
+          <a:effectRef idx="1">
+            <a:schemeClr val="accent1"/>
+          </a:effectRef>
+          <a:fontRef idx="minor">
+            <a:schemeClr val="tx1"/>
+          </a:fontRef>
+        </p:style>
+      </p:cxnSp>
     </p:spTree>
     <p:extLst>
       <p:ext uri="{BB962C8B-B14F-4D97-AF65-F5344CB8AC3E}">
-        <p14:creationId xmlns:p14="http://schemas.microsoft.com/office/powerpoint/2010/main" val="504832622"/>
+        <p14:creationId xmlns:p14="http://schemas.microsoft.com/office/powerpoint/2010/main" val="2081747946"/>
       </p:ext>
     </p:extLst>
   </p:cSld>
@@ -3692,88 +3875,9 @@
   <p:timing>
     <p:tnLst>
       <p:par>
-        <p:cTn xmlns:p14="http://schemas.microsoft.com/office/powerpoint/2010/main" id="1" dur="indefinite" restart="never" nodeType="tmRoot">
-          <p:childTnLst>
-            <p:seq concurrent="1" nextAc="seek">
-              <p:cTn id="2" dur="indefinite" nodeType="mainSeq">
-                <p:childTnLst>
-                  <p:par>
-                    <p:cTn id="3" fill="hold">
-                      <p:stCondLst>
-                        <p:cond delay="indefinite"/>
-                      </p:stCondLst>
-                      <p:childTnLst>
-                        <p:par>
-                          <p:cTn id="4" fill="hold">
-                            <p:stCondLst>
-                              <p:cond delay="0"/>
-                            </p:stCondLst>
-                            <p:childTnLst>
-                              <p:par>
-                                <p:cTn id="5" presetID="10" presetClass="entr" presetSubtype="0" fill="hold" grpId="0" nodeType="clickEffect">
-                                  <p:stCondLst>
-                                    <p:cond delay="0"/>
-                                  </p:stCondLst>
-                                  <p:childTnLst>
-                                    <p:set>
-                                      <p:cBhvr>
-                                        <p:cTn id="6" dur="1" fill="hold">
-                                          <p:stCondLst>
-                                            <p:cond delay="0"/>
-                                          </p:stCondLst>
-                                        </p:cTn>
-                                        <p:tgtEl>
-                                          <p:spTgt spid="6"/>
-                                        </p:tgtEl>
-                                        <p:attrNameLst>
-                                          <p:attrName>style.visibility</p:attrName>
-                                        </p:attrNameLst>
-                                      </p:cBhvr>
-                                      <p:to>
-                                        <p:strVal val="visible"/>
-                                      </p:to>
-                                    </p:set>
-                                    <p:animEffect transition="in" filter="fade">
-                                      <p:cBhvr>
-                                        <p:cTn id="7" dur="500"/>
-                                        <p:tgtEl>
-                                          <p:spTgt spid="6"/>
-                                        </p:tgtEl>
-                                      </p:cBhvr>
-                                    </p:animEffect>
-                                  </p:childTnLst>
-                                </p:cTn>
-                              </p:par>
-                            </p:childTnLst>
-                          </p:cTn>
-                        </p:par>
-                      </p:childTnLst>
-                    </p:cTn>
-                  </p:par>
-                </p:childTnLst>
-              </p:cTn>
-              <p:prevCondLst>
-                <p:cond evt="onPrev" delay="0">
-                  <p:tgtEl>
-                    <p:sldTgt/>
-                  </p:tgtEl>
-                </p:cond>
-              </p:prevCondLst>
-              <p:nextCondLst>
-                <p:cond evt="onNext" delay="0">
-                  <p:tgtEl>
-                    <p:sldTgt/>
-                  </p:tgtEl>
-                </p:cond>
-              </p:nextCondLst>
-            </p:seq>
-          </p:childTnLst>
-        </p:cTn>
+        <p:cTn xmlns:p14="http://schemas.microsoft.com/office/powerpoint/2010/main" id="1" dur="indefinite" restart="never" nodeType="tmRoot"/>
       </p:par>
     </p:tnLst>
-    <p:bldLst>
-      <p:bldP spid="6" grpId="0" animBg="1"/>
-    </p:bldLst>
   </p:timing>
 </p:sld>
 </file>
@@ -3795,43 +3899,9 @@
           <a:chExt cx="0" cy="0"/>
         </a:xfrm>
       </p:grpSpPr>
-      <p:sp>
-        <p:nvSpPr>
-          <p:cNvPr id="2" name="Title 1"/>
-          <p:cNvSpPr>
-            <a:spLocks noGrp="1"/>
-          </p:cNvSpPr>
-          <p:nvPr>
-            <p:ph type="title"/>
-          </p:nvPr>
-        </p:nvSpPr>
-        <p:spPr>
-          <a:xfrm>
-            <a:off x="457200" y="2767013"/>
-            <a:ext cx="8229600" cy="1143000"/>
-          </a:xfrm>
-        </p:spPr>
-        <p:txBody>
-          <a:bodyPr>
-            <a:normAutofit fontScale="90000"/>
-          </a:bodyPr>
-          <a:lstStyle/>
-          <a:p>
-            <a:r>
-              <a:rPr lang="en-US" sz="9600" dirty="0" smtClean="0">
-                <a:solidFill>
-                  <a:srgbClr val="4EC5C1"/>
-                </a:solidFill>
-              </a:rPr>
-              <a:t>USER LOGIN</a:t>
-            </a:r>
-            <a:endParaRPr lang="en-US" dirty="0"/>
-          </a:p>
-        </p:txBody>
-      </p:sp>
       <p:pic>
         <p:nvPicPr>
-          <p:cNvPr id="4" name="Picture 3" descr="mockup3.png"/>
+          <p:cNvPr id="10" name="Picture 9" descr="Screen Shot 2014-03-25 at 1.48.10 AM.png"/>
           <p:cNvPicPr>
             <a:picLocks noChangeAspect="1"/>
           </p:cNvPicPr>
@@ -3851,18 +3921,205 @@
         </p:blipFill>
         <p:spPr>
           <a:xfrm>
-            <a:off x="0" y="0"/>
-            <a:ext cx="9144000" cy="6858000"/>
+            <a:off x="0" y="671104"/>
+            <a:ext cx="9144000" cy="4911926"/>
           </a:xfrm>
           <a:prstGeom prst="rect">
             <a:avLst/>
           </a:prstGeom>
         </p:spPr>
       </p:pic>
+      <p:sp>
+        <p:nvSpPr>
+          <p:cNvPr id="4" name="Title 1"/>
+          <p:cNvSpPr txBox="1">
+            <a:spLocks/>
+          </p:cNvSpPr>
+          <p:nvPr/>
+        </p:nvSpPr>
+        <p:spPr>
+          <a:xfrm>
+            <a:off x="310143" y="-123908"/>
+            <a:ext cx="7924803" cy="1143000"/>
+          </a:xfrm>
+          <a:prstGeom prst="rect">
+            <a:avLst/>
+          </a:prstGeom>
+        </p:spPr>
+        <p:txBody>
+          <a:bodyPr vert="horz" lIns="91440" tIns="45720" rIns="91440" bIns="45720" rtlCol="0" anchor="ctr">
+            <a:noAutofit/>
+          </a:bodyPr>
+          <a:lstStyle>
+            <a:lvl1pPr algn="ctr" defTabSz="457200" rtl="0" eaLnBrk="1" latinLnBrk="0" hangingPunct="1">
+              <a:spcBef>
+                <a:spcPct val="0"/>
+              </a:spcBef>
+              <a:buNone/>
+              <a:defRPr sz="4400" kern="1200">
+                <a:solidFill>
+                  <a:schemeClr val="tx1"/>
+                </a:solidFill>
+                <a:latin typeface="+mj-lt"/>
+                <a:ea typeface="+mj-ea"/>
+                <a:cs typeface="+mj-cs"/>
+              </a:defRPr>
+            </a:lvl1pPr>
+          </a:lstStyle>
+          <a:p>
+            <a:pPr algn="l"/>
+            <a:r>
+              <a:rPr lang="en-US" sz="4800" dirty="0" smtClean="0">
+                <a:solidFill>
+                  <a:srgbClr val="4EC5C1"/>
+                </a:solidFill>
+              </a:rPr>
+              <a:t>EDIT POST</a:t>
+            </a:r>
+            <a:endParaRPr lang="en-US" sz="4800" dirty="0">
+              <a:solidFill>
+                <a:srgbClr val="4EC5C1"/>
+              </a:solidFill>
+            </a:endParaRPr>
+          </a:p>
+        </p:txBody>
+      </p:sp>
+      <p:sp>
+        <p:nvSpPr>
+          <p:cNvPr id="6" name="Rectangle 5"/>
+          <p:cNvSpPr/>
+          <p:nvPr/>
+        </p:nvSpPr>
+        <p:spPr>
+          <a:xfrm>
+            <a:off x="3930311" y="1390322"/>
+            <a:ext cx="334211" cy="227263"/>
+          </a:xfrm>
+          <a:prstGeom prst="rect">
+            <a:avLst/>
+          </a:prstGeom>
+          <a:noFill/>
+          <a:ln>
+            <a:solidFill>
+              <a:srgbClr val="262626"/>
+            </a:solidFill>
+          </a:ln>
+        </p:spPr>
+        <p:style>
+          <a:lnRef idx="1">
+            <a:schemeClr val="accent1"/>
+          </a:lnRef>
+          <a:fillRef idx="3">
+            <a:schemeClr val="accent1"/>
+          </a:fillRef>
+          <a:effectRef idx="2">
+            <a:schemeClr val="accent1"/>
+          </a:effectRef>
+          <a:fontRef idx="minor">
+            <a:schemeClr val="lt1"/>
+          </a:fontRef>
+        </p:style>
+        <p:txBody>
+          <a:bodyPr rtlCol="0" anchor="ctr"/>
+          <a:lstStyle/>
+          <a:p>
+            <a:pPr algn="ctr"/>
+            <a:endParaRPr lang="en-US"/>
+          </a:p>
+        </p:txBody>
+      </p:sp>
+      <p:sp>
+        <p:nvSpPr>
+          <p:cNvPr id="7" name="Rectangle 6"/>
+          <p:cNvSpPr/>
+          <p:nvPr/>
+        </p:nvSpPr>
+        <p:spPr>
+          <a:xfrm>
+            <a:off x="2625555" y="2665666"/>
+            <a:ext cx="334211" cy="227263"/>
+          </a:xfrm>
+          <a:prstGeom prst="rect">
+            <a:avLst/>
+          </a:prstGeom>
+          <a:noFill/>
+          <a:ln>
+            <a:solidFill>
+              <a:srgbClr val="262626"/>
+            </a:solidFill>
+          </a:ln>
+        </p:spPr>
+        <p:style>
+          <a:lnRef idx="1">
+            <a:schemeClr val="accent1"/>
+          </a:lnRef>
+          <a:fillRef idx="3">
+            <a:schemeClr val="accent1"/>
+          </a:fillRef>
+          <a:effectRef idx="2">
+            <a:schemeClr val="accent1"/>
+          </a:effectRef>
+          <a:fontRef idx="minor">
+            <a:schemeClr val="lt1"/>
+          </a:fontRef>
+        </p:style>
+        <p:txBody>
+          <a:bodyPr rtlCol="0" anchor="ctr"/>
+          <a:lstStyle/>
+          <a:p>
+            <a:pPr algn="ctr"/>
+            <a:endParaRPr lang="en-US"/>
+          </a:p>
+        </p:txBody>
+      </p:sp>
+      <p:sp>
+        <p:nvSpPr>
+          <p:cNvPr id="8" name="Rectangle 7"/>
+          <p:cNvSpPr/>
+          <p:nvPr/>
+        </p:nvSpPr>
+        <p:spPr>
+          <a:xfrm>
+            <a:off x="3106819" y="4216399"/>
+            <a:ext cx="334211" cy="227263"/>
+          </a:xfrm>
+          <a:prstGeom prst="rect">
+            <a:avLst/>
+          </a:prstGeom>
+          <a:noFill/>
+          <a:ln>
+            <a:solidFill>
+              <a:srgbClr val="262626"/>
+            </a:solidFill>
+          </a:ln>
+        </p:spPr>
+        <p:style>
+          <a:lnRef idx="1">
+            <a:schemeClr val="accent1"/>
+          </a:lnRef>
+          <a:fillRef idx="3">
+            <a:schemeClr val="accent1"/>
+          </a:fillRef>
+          <a:effectRef idx="2">
+            <a:schemeClr val="accent1"/>
+          </a:effectRef>
+          <a:fontRef idx="minor">
+            <a:schemeClr val="lt1"/>
+          </a:fontRef>
+        </p:style>
+        <p:txBody>
+          <a:bodyPr rtlCol="0" anchor="ctr"/>
+          <a:lstStyle/>
+          <a:p>
+            <a:pPr algn="ctr"/>
+            <a:endParaRPr lang="en-US"/>
+          </a:p>
+        </p:txBody>
+      </p:sp>
     </p:spTree>
     <p:extLst>
       <p:ext uri="{BB962C8B-B14F-4D97-AF65-F5344CB8AC3E}">
-        <p14:creationId xmlns:p14="http://schemas.microsoft.com/office/powerpoint/2010/main" val="2937527511"/>
+        <p14:creationId xmlns:p14="http://schemas.microsoft.com/office/powerpoint/2010/main" val="4085078768"/>
       </p:ext>
     </p:extLst>
   </p:cSld>
@@ -3872,83 +4129,7 @@
   <p:timing>
     <p:tnLst>
       <p:par>
-        <p:cTn xmlns:p14="http://schemas.microsoft.com/office/powerpoint/2010/main" id="1" dur="indefinite" restart="never" nodeType="tmRoot">
-          <p:childTnLst>
-            <p:seq concurrent="1" nextAc="seek">
-              <p:cTn id="2" dur="indefinite" nodeType="mainSeq">
-                <p:childTnLst>
-                  <p:par>
-                    <p:cTn id="3" fill="hold">
-                      <p:stCondLst>
-                        <p:cond delay="indefinite"/>
-                      </p:stCondLst>
-                      <p:childTnLst>
-                        <p:par>
-                          <p:cTn id="4" fill="hold">
-                            <p:stCondLst>
-                              <p:cond delay="0"/>
-                            </p:stCondLst>
-                            <p:childTnLst>
-                              <p:par>
-                                <p:cTn id="5" presetID="10" presetClass="entr" presetSubtype="0" fill="hold" nodeType="clickEffect">
-                                  <p:stCondLst>
-                                    <p:cond delay="0"/>
-                                  </p:stCondLst>
-                                  <p:childTnLst>
-                                    <p:set>
-                                      <p:cBhvr>
-                                        <p:cTn id="6" dur="1" fill="hold">
-                                          <p:stCondLst>
-                                            <p:cond delay="0"/>
-                                          </p:stCondLst>
-                                        </p:cTn>
-                                        <p:tgtEl>
-                                          <p:spTgt spid="4"/>
-                                        </p:tgtEl>
-                                        <p:attrNameLst>
-                                          <p:attrName>style.visibility</p:attrName>
-                                        </p:attrNameLst>
-                                      </p:cBhvr>
-                                      <p:to>
-                                        <p:strVal val="visible"/>
-                                      </p:to>
-                                    </p:set>
-                                    <p:animEffect transition="in" filter="fade">
-                                      <p:cBhvr>
-                                        <p:cTn id="7" dur="500"/>
-                                        <p:tgtEl>
-                                          <p:spTgt spid="4"/>
-                                        </p:tgtEl>
-                                      </p:cBhvr>
-                                    </p:animEffect>
-                                  </p:childTnLst>
-                                </p:cTn>
-                              </p:par>
-                            </p:childTnLst>
-                          </p:cTn>
-                        </p:par>
-                      </p:childTnLst>
-                    </p:cTn>
-                  </p:par>
-                </p:childTnLst>
-              </p:cTn>
-              <p:prevCondLst>
-                <p:cond evt="onPrev" delay="0">
-                  <p:tgtEl>
-                    <p:sldTgt/>
-                  </p:tgtEl>
-                </p:cond>
-              </p:prevCondLst>
-              <p:nextCondLst>
-                <p:cond evt="onNext" delay="0">
-                  <p:tgtEl>
-                    <p:sldTgt/>
-                  </p:tgtEl>
-                </p:cond>
-              </p:nextCondLst>
-            </p:seq>
-          </p:childTnLst>
-        </p:cTn>
+        <p:cTn xmlns:p14="http://schemas.microsoft.com/office/powerpoint/2010/main" id="1" dur="indefinite" restart="never" nodeType="tmRoot"/>
       </p:par>
     </p:tnLst>
   </p:timing>
@@ -3972,112 +4153,9 @@
           <a:chExt cx="0" cy="0"/>
         </a:xfrm>
       </p:grpSpPr>
-      <p:sp>
-        <p:nvSpPr>
-          <p:cNvPr id="6" name="Rectangle 5"/>
-          <p:cNvSpPr/>
-          <p:nvPr/>
-        </p:nvSpPr>
-        <p:spPr>
-          <a:xfrm>
-            <a:off x="0" y="0"/>
-            <a:ext cx="9144000" cy="2351314"/>
-          </a:xfrm>
-          <a:prstGeom prst="rect">
-            <a:avLst/>
-          </a:prstGeom>
-          <a:solidFill>
-            <a:srgbClr val="FC4D07"/>
-          </a:solidFill>
-        </p:spPr>
-        <p:style>
-          <a:lnRef idx="1">
-            <a:schemeClr val="accent1"/>
-          </a:lnRef>
-          <a:fillRef idx="3">
-            <a:schemeClr val="accent1"/>
-          </a:fillRef>
-          <a:effectRef idx="2">
-            <a:schemeClr val="accent1"/>
-          </a:effectRef>
-          <a:fontRef idx="minor">
-            <a:schemeClr val="lt1"/>
-          </a:fontRef>
-        </p:style>
-        <p:txBody>
-          <a:bodyPr rtlCol="0" anchor="ctr"/>
-          <a:lstStyle/>
-          <a:p>
-            <a:pPr algn="ctr">
-              <a:lnSpc>
-                <a:spcPct val="70000"/>
-              </a:lnSpc>
-            </a:pPr>
-            <a:endParaRPr lang="en-US"/>
-          </a:p>
-        </p:txBody>
-      </p:sp>
-      <p:sp>
-        <p:nvSpPr>
-          <p:cNvPr id="2" name="Title 1"/>
-          <p:cNvSpPr>
-            <a:spLocks noGrp="1"/>
-          </p:cNvSpPr>
-          <p:nvPr>
-            <p:ph type="title"/>
-          </p:nvPr>
-        </p:nvSpPr>
-        <p:spPr>
-          <a:xfrm>
-            <a:off x="839695" y="1128939"/>
-            <a:ext cx="8229600" cy="1143000"/>
-          </a:xfrm>
-        </p:spPr>
-        <p:txBody>
-          <a:bodyPr>
-            <a:normAutofit fontScale="90000"/>
-          </a:bodyPr>
-          <a:lstStyle/>
-          <a:p>
-            <a:pPr algn="r">
-              <a:lnSpc>
-                <a:spcPct val="70000"/>
-              </a:lnSpc>
-            </a:pPr>
-            <a:r>
-              <a:rPr lang="en-US" sz="6600" dirty="0" smtClean="0">
-                <a:solidFill>
-                  <a:schemeClr val="bg1"/>
-                </a:solidFill>
-              </a:rPr>
-              <a:t>Thread Support</a:t>
-            </a:r>
-            <a:br>
-              <a:rPr lang="en-US" sz="6600" dirty="0" smtClean="0">
-                <a:solidFill>
-                  <a:schemeClr val="bg1"/>
-                </a:solidFill>
-              </a:rPr>
-            </a:br>
-            <a:r>
-              <a:rPr lang="en-US" dirty="0" smtClean="0">
-                <a:solidFill>
-                  <a:schemeClr val="bg1"/>
-                </a:solidFill>
-              </a:rPr>
-              <a:t>(Ideal look)</a:t>
-            </a:r>
-            <a:endParaRPr lang="en-US" dirty="0">
-              <a:solidFill>
-                <a:schemeClr val="bg1"/>
-              </a:solidFill>
-            </a:endParaRPr>
-          </a:p>
-        </p:txBody>
-      </p:sp>
       <p:pic>
         <p:nvPicPr>
-          <p:cNvPr id="5" name="Picture 4" descr="Screen Shot 2014-02-25 at 1.01.14 AM.png"/>
+          <p:cNvPr id="10" name="Picture 9" descr="Screen Shot 2014-03-25 at 1.48.10 AM.png"/>
           <p:cNvPicPr>
             <a:picLocks noChangeAspect="1"/>
           </p:cNvPicPr>
@@ -4097,18 +4175,332 @@
         </p:blipFill>
         <p:spPr>
           <a:xfrm>
-            <a:off x="0" y="2351314"/>
-            <a:ext cx="9144000" cy="4506686"/>
+            <a:off x="0" y="671104"/>
+            <a:ext cx="9144000" cy="4911926"/>
           </a:xfrm>
           <a:prstGeom prst="rect">
             <a:avLst/>
           </a:prstGeom>
         </p:spPr>
       </p:pic>
+      <p:sp>
+        <p:nvSpPr>
+          <p:cNvPr id="4" name="Title 1"/>
+          <p:cNvSpPr txBox="1">
+            <a:spLocks/>
+          </p:cNvSpPr>
+          <p:nvPr/>
+        </p:nvSpPr>
+        <p:spPr>
+          <a:xfrm>
+            <a:off x="310143" y="-123908"/>
+            <a:ext cx="7924803" cy="1143000"/>
+          </a:xfrm>
+          <a:prstGeom prst="rect">
+            <a:avLst/>
+          </a:prstGeom>
+        </p:spPr>
+        <p:txBody>
+          <a:bodyPr vert="horz" lIns="91440" tIns="45720" rIns="91440" bIns="45720" rtlCol="0" anchor="ctr">
+            <a:noAutofit/>
+          </a:bodyPr>
+          <a:lstStyle>
+            <a:lvl1pPr algn="ctr" defTabSz="457200" rtl="0" eaLnBrk="1" latinLnBrk="0" hangingPunct="1">
+              <a:spcBef>
+                <a:spcPct val="0"/>
+              </a:spcBef>
+              <a:buNone/>
+              <a:defRPr sz="4400" kern="1200">
+                <a:solidFill>
+                  <a:schemeClr val="tx1"/>
+                </a:solidFill>
+                <a:latin typeface="+mj-lt"/>
+                <a:ea typeface="+mj-ea"/>
+                <a:cs typeface="+mj-cs"/>
+              </a:defRPr>
+            </a:lvl1pPr>
+          </a:lstStyle>
+          <a:p>
+            <a:pPr algn="l"/>
+            <a:r>
+              <a:rPr lang="en-US" sz="4800" dirty="0" smtClean="0">
+                <a:solidFill>
+                  <a:srgbClr val="4EC5C1"/>
+                </a:solidFill>
+              </a:rPr>
+              <a:t>USER LEVELS</a:t>
+            </a:r>
+            <a:endParaRPr lang="en-US" sz="4800" dirty="0">
+              <a:solidFill>
+                <a:srgbClr val="4EC5C1"/>
+              </a:solidFill>
+            </a:endParaRPr>
+          </a:p>
+        </p:txBody>
+      </p:sp>
+      <p:sp>
+        <p:nvSpPr>
+          <p:cNvPr id="6" name="Rectangle 5"/>
+          <p:cNvSpPr/>
+          <p:nvPr/>
+        </p:nvSpPr>
+        <p:spPr>
+          <a:xfrm>
+            <a:off x="601574" y="1390322"/>
+            <a:ext cx="334211" cy="227263"/>
+          </a:xfrm>
+          <a:prstGeom prst="rect">
+            <a:avLst/>
+          </a:prstGeom>
+          <a:noFill/>
+          <a:ln>
+            <a:solidFill>
+              <a:srgbClr val="262626"/>
+            </a:solidFill>
+          </a:ln>
+        </p:spPr>
+        <p:style>
+          <a:lnRef idx="1">
+            <a:schemeClr val="accent1"/>
+          </a:lnRef>
+          <a:fillRef idx="3">
+            <a:schemeClr val="accent1"/>
+          </a:fillRef>
+          <a:effectRef idx="2">
+            <a:schemeClr val="accent1"/>
+          </a:effectRef>
+          <a:fontRef idx="minor">
+            <a:schemeClr val="lt1"/>
+          </a:fontRef>
+        </p:style>
+        <p:txBody>
+          <a:bodyPr rtlCol="0" anchor="ctr"/>
+          <a:lstStyle/>
+          <a:p>
+            <a:pPr algn="ctr"/>
+            <a:endParaRPr lang="en-US"/>
+          </a:p>
+        </p:txBody>
+      </p:sp>
+      <p:sp>
+        <p:nvSpPr>
+          <p:cNvPr id="7" name="Rectangle 6"/>
+          <p:cNvSpPr/>
+          <p:nvPr/>
+        </p:nvSpPr>
+        <p:spPr>
+          <a:xfrm>
+            <a:off x="601574" y="2665666"/>
+            <a:ext cx="334211" cy="227263"/>
+          </a:xfrm>
+          <a:prstGeom prst="rect">
+            <a:avLst/>
+          </a:prstGeom>
+          <a:noFill/>
+          <a:ln>
+            <a:solidFill>
+              <a:srgbClr val="262626"/>
+            </a:solidFill>
+          </a:ln>
+        </p:spPr>
+        <p:style>
+          <a:lnRef idx="1">
+            <a:schemeClr val="accent1"/>
+          </a:lnRef>
+          <a:fillRef idx="3">
+            <a:schemeClr val="accent1"/>
+          </a:fillRef>
+          <a:effectRef idx="2">
+            <a:schemeClr val="accent1"/>
+          </a:effectRef>
+          <a:fontRef idx="minor">
+            <a:schemeClr val="lt1"/>
+          </a:fontRef>
+        </p:style>
+        <p:txBody>
+          <a:bodyPr rtlCol="0" anchor="ctr"/>
+          <a:lstStyle/>
+          <a:p>
+            <a:pPr algn="ctr"/>
+            <a:endParaRPr lang="en-US"/>
+          </a:p>
+        </p:txBody>
+      </p:sp>
+      <p:sp>
+        <p:nvSpPr>
+          <p:cNvPr id="8" name="Rectangle 7"/>
+          <p:cNvSpPr/>
+          <p:nvPr/>
+        </p:nvSpPr>
+        <p:spPr>
+          <a:xfrm>
+            <a:off x="1089522" y="4256503"/>
+            <a:ext cx="334211" cy="227263"/>
+          </a:xfrm>
+          <a:prstGeom prst="rect">
+            <a:avLst/>
+          </a:prstGeom>
+          <a:noFill/>
+          <a:ln>
+            <a:solidFill>
+              <a:srgbClr val="262626"/>
+            </a:solidFill>
+          </a:ln>
+        </p:spPr>
+        <p:style>
+          <a:lnRef idx="1">
+            <a:schemeClr val="accent1"/>
+          </a:lnRef>
+          <a:fillRef idx="3">
+            <a:schemeClr val="accent1"/>
+          </a:fillRef>
+          <a:effectRef idx="2">
+            <a:schemeClr val="accent1"/>
+          </a:effectRef>
+          <a:fontRef idx="minor">
+            <a:schemeClr val="lt1"/>
+          </a:fontRef>
+        </p:style>
+        <p:txBody>
+          <a:bodyPr rtlCol="0" anchor="ctr"/>
+          <a:lstStyle/>
+          <a:p>
+            <a:pPr algn="ctr"/>
+            <a:endParaRPr lang="en-US"/>
+          </a:p>
+        </p:txBody>
+      </p:sp>
+      <p:sp>
+        <p:nvSpPr>
+          <p:cNvPr id="9" name="Rectangle 8"/>
+          <p:cNvSpPr/>
+          <p:nvPr/>
+        </p:nvSpPr>
+        <p:spPr>
+          <a:xfrm>
+            <a:off x="848887" y="3473120"/>
+            <a:ext cx="334211" cy="227263"/>
+          </a:xfrm>
+          <a:prstGeom prst="rect">
+            <a:avLst/>
+          </a:prstGeom>
+          <a:noFill/>
+          <a:ln>
+            <a:solidFill>
+              <a:srgbClr val="262626"/>
+            </a:solidFill>
+          </a:ln>
+        </p:spPr>
+        <p:style>
+          <a:lnRef idx="1">
+            <a:schemeClr val="accent1"/>
+          </a:lnRef>
+          <a:fillRef idx="3">
+            <a:schemeClr val="accent1"/>
+          </a:fillRef>
+          <a:effectRef idx="2">
+            <a:schemeClr val="accent1"/>
+          </a:effectRef>
+          <a:fontRef idx="minor">
+            <a:schemeClr val="lt1"/>
+          </a:fontRef>
+        </p:style>
+        <p:txBody>
+          <a:bodyPr rtlCol="0" anchor="ctr"/>
+          <a:lstStyle/>
+          <a:p>
+            <a:pPr algn="ctr"/>
+            <a:endParaRPr lang="en-US"/>
+          </a:p>
+        </p:txBody>
+      </p:sp>
+      <p:sp>
+        <p:nvSpPr>
+          <p:cNvPr id="11" name="Rectangle 10"/>
+          <p:cNvSpPr/>
+          <p:nvPr/>
+        </p:nvSpPr>
+        <p:spPr>
+          <a:xfrm>
+            <a:off x="848887" y="5037224"/>
+            <a:ext cx="334211" cy="227263"/>
+          </a:xfrm>
+          <a:prstGeom prst="rect">
+            <a:avLst/>
+          </a:prstGeom>
+          <a:noFill/>
+          <a:ln>
+            <a:solidFill>
+              <a:srgbClr val="262626"/>
+            </a:solidFill>
+          </a:ln>
+        </p:spPr>
+        <p:style>
+          <a:lnRef idx="1">
+            <a:schemeClr val="accent1"/>
+          </a:lnRef>
+          <a:fillRef idx="3">
+            <a:schemeClr val="accent1"/>
+          </a:fillRef>
+          <a:effectRef idx="2">
+            <a:schemeClr val="accent1"/>
+          </a:effectRef>
+          <a:fontRef idx="minor">
+            <a:schemeClr val="lt1"/>
+          </a:fontRef>
+        </p:style>
+        <p:txBody>
+          <a:bodyPr rtlCol="0" anchor="ctr"/>
+          <a:lstStyle/>
+          <a:p>
+            <a:pPr algn="ctr"/>
+            <a:endParaRPr lang="en-US"/>
+          </a:p>
+        </p:txBody>
+      </p:sp>
+      <p:sp>
+        <p:nvSpPr>
+          <p:cNvPr id="2" name="TextBox 1"/>
+          <p:cNvSpPr txBox="1"/>
+          <p:nvPr/>
+        </p:nvSpPr>
+        <p:spPr>
+          <a:xfrm>
+            <a:off x="310142" y="5781386"/>
+            <a:ext cx="8548107" cy="923330"/>
+          </a:xfrm>
+          <a:prstGeom prst="rect">
+            <a:avLst/>
+          </a:prstGeom>
+          <a:noFill/>
+        </p:spPr>
+        <p:txBody>
+          <a:bodyPr wrap="square" rtlCol="0">
+            <a:spAutoFit/>
+          </a:bodyPr>
+          <a:lstStyle/>
+          <a:p>
+            <a:pPr algn="ctr"/>
+            <a:r>
+              <a:rPr lang="en-US" dirty="0" smtClean="0"/>
+              <a:t>Since </a:t>
+            </a:r>
+            <a:r>
+              <a:rPr lang="en-US" dirty="0" err="1" smtClean="0"/>
+              <a:t>HackChat</a:t>
+            </a:r>
+            <a:r>
+              <a:rPr lang="en-US" dirty="0" smtClean="0"/>
+              <a:t> is not a traditional forum model, we didn’t have much room to display user level. The idea of small icons that can indicate user’s level become one of the plausible implementation for this feature.</a:t>
+            </a:r>
+            <a:endParaRPr lang="en-US" dirty="0"/>
+          </a:p>
+        </p:txBody>
+      </p:sp>
     </p:spTree>
     <p:extLst>
       <p:ext uri="{BB962C8B-B14F-4D97-AF65-F5344CB8AC3E}">
-        <p14:creationId xmlns:p14="http://schemas.microsoft.com/office/powerpoint/2010/main" val="4242320093"/>
+        <p14:creationId xmlns:p14="http://schemas.microsoft.com/office/powerpoint/2010/main" val="2338159267"/>
       </p:ext>
     </p:extLst>
   </p:cSld>
@@ -4144,45 +4536,49 @@
       </p:grpSpPr>
       <p:sp>
         <p:nvSpPr>
-          <p:cNvPr id="2" name="Title 1"/>
-          <p:cNvSpPr>
-            <a:spLocks noGrp="1"/>
-          </p:cNvSpPr>
-          <p:nvPr>
-            <p:ph type="title"/>
-          </p:nvPr>
-        </p:nvSpPr>
-        <p:spPr>
-          <a:xfrm>
-            <a:off x="457200" y="2941638"/>
-            <a:ext cx="8229600" cy="1143000"/>
-          </a:xfrm>
-        </p:spPr>
-        <p:txBody>
-          <a:bodyPr>
-            <a:noAutofit/>
+          <p:cNvPr id="2" name="TextBox 1"/>
+          <p:cNvSpPr txBox="1"/>
+          <p:nvPr/>
+        </p:nvSpPr>
+        <p:spPr>
+          <a:xfrm>
+            <a:off x="506416" y="5410489"/>
+            <a:ext cx="8210402" cy="1200329"/>
+          </a:xfrm>
+          <a:prstGeom prst="rect">
+            <a:avLst/>
+          </a:prstGeom>
+          <a:noFill/>
+        </p:spPr>
+        <p:txBody>
+          <a:bodyPr wrap="square" rtlCol="0">
+            <a:spAutoFit/>
           </a:bodyPr>
           <a:lstStyle/>
           <a:p>
-            <a:r>
-              <a:rPr lang="en-US" sz="8000" dirty="0" smtClean="0">
-                <a:solidFill>
-                  <a:srgbClr val="4EC5C1"/>
-                </a:solidFill>
-              </a:rPr>
-              <a:t>MULTIPLE FORUMS</a:t>
-            </a:r>
-            <a:endParaRPr lang="en-US" sz="8000" dirty="0">
-              <a:solidFill>
-                <a:srgbClr val="4EC5C1"/>
-              </a:solidFill>
-            </a:endParaRPr>
+            <a:pPr algn="ctr"/>
+            <a:r>
+              <a:rPr lang="en-US" dirty="0" smtClean="0"/>
+              <a:t>Icons in front of the username indicate their user level. The icons with special colors indicate that the user may be an admin or a moderator.</a:t>
+            </a:r>
+          </a:p>
+          <a:p>
+            <a:pPr algn="ctr"/>
+            <a:endParaRPr lang="en-US" dirty="0"/>
+          </a:p>
+          <a:p>
+            <a:pPr algn="ctr"/>
+            <a:r>
+              <a:rPr lang="en-US" dirty="0" smtClean="0"/>
+              <a:t>Color, shapes, and the level’s calculation may be change later on.</a:t>
+            </a:r>
+            <a:endParaRPr lang="en-US" dirty="0"/>
           </a:p>
         </p:txBody>
       </p:sp>
       <p:pic>
         <p:nvPicPr>
-          <p:cNvPr id="4" name="Picture 3" descr="mockup4.png"/>
+          <p:cNvPr id="3" name="Picture 2" descr="Screen Shot 2014-03-25 at 1.52.04 AM.png"/>
           <p:cNvPicPr>
             <a:picLocks noChangeAspect="1"/>
           </p:cNvPicPr>
@@ -4202,18 +4598,555 @@
         </p:blipFill>
         <p:spPr>
           <a:xfrm>
-            <a:off x="0" y="0"/>
-            <a:ext cx="9144000" cy="6858000"/>
+            <a:off x="636147" y="2058833"/>
+            <a:ext cx="3263900" cy="571500"/>
           </a:xfrm>
           <a:prstGeom prst="rect">
             <a:avLst/>
           </a:prstGeom>
         </p:spPr>
       </p:pic>
+      <p:pic>
+        <p:nvPicPr>
+          <p:cNvPr id="5" name="Picture 4" descr="Screen Shot 2014-03-25 at 1.52.10 AM.png"/>
+          <p:cNvPicPr>
+            <a:picLocks noChangeAspect="1"/>
+          </p:cNvPicPr>
+          <p:nvPr/>
+        </p:nvPicPr>
+        <p:blipFill>
+          <a:blip r:embed="rId3">
+            <a:extLst>
+              <a:ext uri="{28A0092B-C50C-407E-A947-70E740481C1C}">
+                <a14:useLocalDpi xmlns:a14="http://schemas.microsoft.com/office/drawing/2010/main" val="0"/>
+              </a:ext>
+            </a:extLst>
+          </a:blip>
+          <a:stretch>
+            <a:fillRect/>
+          </a:stretch>
+        </p:blipFill>
+        <p:spPr>
+          <a:xfrm>
+            <a:off x="636147" y="2872778"/>
+            <a:ext cx="2578100" cy="558800"/>
+          </a:xfrm>
+          <a:prstGeom prst="rect">
+            <a:avLst/>
+          </a:prstGeom>
+        </p:spPr>
+      </p:pic>
+      <p:pic>
+        <p:nvPicPr>
+          <p:cNvPr id="12" name="Picture 11" descr="Screen Shot 2014-03-25 at 1.52.17 AM.png"/>
+          <p:cNvPicPr>
+            <a:picLocks noChangeAspect="1"/>
+          </p:cNvPicPr>
+          <p:nvPr/>
+        </p:nvPicPr>
+        <p:blipFill>
+          <a:blip r:embed="rId4">
+            <a:extLst>
+              <a:ext uri="{28A0092B-C50C-407E-A947-70E740481C1C}">
+                <a14:useLocalDpi xmlns:a14="http://schemas.microsoft.com/office/drawing/2010/main" val="0"/>
+              </a:ext>
+            </a:extLst>
+          </a:blip>
+          <a:stretch>
+            <a:fillRect/>
+          </a:stretch>
+        </p:blipFill>
+        <p:spPr>
+          <a:xfrm>
+            <a:off x="4446150" y="2072688"/>
+            <a:ext cx="2755900" cy="546100"/>
+          </a:xfrm>
+          <a:prstGeom prst="rect">
+            <a:avLst/>
+          </a:prstGeom>
+        </p:spPr>
+      </p:pic>
+      <p:pic>
+        <p:nvPicPr>
+          <p:cNvPr id="13" name="Picture 12" descr="Screen Shot 2014-03-25 at 1.52.22 AM.png"/>
+          <p:cNvPicPr>
+            <a:picLocks noChangeAspect="1"/>
+          </p:cNvPicPr>
+          <p:nvPr/>
+        </p:nvPicPr>
+        <p:blipFill>
+          <a:blip r:embed="rId5">
+            <a:extLst>
+              <a:ext uri="{28A0092B-C50C-407E-A947-70E740481C1C}">
+                <a14:useLocalDpi xmlns:a14="http://schemas.microsoft.com/office/drawing/2010/main" val="0"/>
+              </a:ext>
+            </a:extLst>
+          </a:blip>
+          <a:stretch>
+            <a:fillRect/>
+          </a:stretch>
+        </p:blipFill>
+        <p:spPr>
+          <a:xfrm>
+            <a:off x="4434605" y="2907413"/>
+            <a:ext cx="4178300" cy="508000"/>
+          </a:xfrm>
+          <a:prstGeom prst="rect">
+            <a:avLst/>
+          </a:prstGeom>
+        </p:spPr>
+      </p:pic>
+      <p:pic>
+        <p:nvPicPr>
+          <p:cNvPr id="14" name="Picture 13" descr="Screen Shot 2014-03-25 at 1.52.27 AM.png"/>
+          <p:cNvPicPr>
+            <a:picLocks noChangeAspect="1"/>
+          </p:cNvPicPr>
+          <p:nvPr/>
+        </p:nvPicPr>
+        <p:blipFill>
+          <a:blip r:embed="rId6">
+            <a:extLst>
+              <a:ext uri="{28A0092B-C50C-407E-A947-70E740481C1C}">
+                <a14:useLocalDpi xmlns:a14="http://schemas.microsoft.com/office/drawing/2010/main" val="0"/>
+              </a:ext>
+            </a:extLst>
+          </a:blip>
+          <a:stretch>
+            <a:fillRect/>
+          </a:stretch>
+        </p:blipFill>
+        <p:spPr>
+          <a:xfrm>
+            <a:off x="4480785" y="3662478"/>
+            <a:ext cx="3276600" cy="622300"/>
+          </a:xfrm>
+          <a:prstGeom prst="rect">
+            <a:avLst/>
+          </a:prstGeom>
+        </p:spPr>
+      </p:pic>
+      <p:sp>
+        <p:nvSpPr>
+          <p:cNvPr id="15" name="Title 1"/>
+          <p:cNvSpPr txBox="1">
+            <a:spLocks/>
+          </p:cNvSpPr>
+          <p:nvPr/>
+        </p:nvSpPr>
+        <p:spPr>
+          <a:xfrm>
+            <a:off x="636147" y="1465037"/>
+            <a:ext cx="3333599" cy="478346"/>
+          </a:xfrm>
+          <a:prstGeom prst="rect">
+            <a:avLst/>
+          </a:prstGeom>
+        </p:spPr>
+        <p:txBody>
+          <a:bodyPr vert="horz" lIns="91440" tIns="45720" rIns="91440" bIns="45720" rtlCol="0" anchor="ctr">
+            <a:noAutofit/>
+          </a:bodyPr>
+          <a:lstStyle>
+            <a:lvl1pPr algn="ctr" defTabSz="457200" rtl="0" eaLnBrk="1" latinLnBrk="0" hangingPunct="1">
+              <a:spcBef>
+                <a:spcPct val="0"/>
+              </a:spcBef>
+              <a:buNone/>
+              <a:defRPr sz="4400" kern="1200">
+                <a:solidFill>
+                  <a:schemeClr val="tx1"/>
+                </a:solidFill>
+                <a:latin typeface="+mj-lt"/>
+                <a:ea typeface="+mj-ea"/>
+                <a:cs typeface="+mj-cs"/>
+              </a:defRPr>
+            </a:lvl1pPr>
+          </a:lstStyle>
+          <a:p>
+            <a:pPr algn="l"/>
+            <a:r>
+              <a:rPr lang="en-US" sz="2800" dirty="0" smtClean="0">
+                <a:solidFill>
+                  <a:schemeClr val="tx1">
+                    <a:lumMod val="95000"/>
+                    <a:lumOff val="5000"/>
+                  </a:schemeClr>
+                </a:solidFill>
+              </a:rPr>
+              <a:t>Special Users</a:t>
+            </a:r>
+            <a:endParaRPr lang="en-US" sz="2800" dirty="0">
+              <a:solidFill>
+                <a:schemeClr val="tx1">
+                  <a:lumMod val="95000"/>
+                  <a:lumOff val="5000"/>
+                </a:schemeClr>
+              </a:solidFill>
+            </a:endParaRPr>
+          </a:p>
+        </p:txBody>
+      </p:sp>
+      <p:sp>
+        <p:nvSpPr>
+          <p:cNvPr id="16" name="Title 1"/>
+          <p:cNvSpPr txBox="1">
+            <a:spLocks/>
+          </p:cNvSpPr>
+          <p:nvPr/>
+        </p:nvSpPr>
+        <p:spPr>
+          <a:xfrm>
+            <a:off x="4513840" y="1465037"/>
+            <a:ext cx="3333599" cy="478346"/>
+          </a:xfrm>
+          <a:prstGeom prst="rect">
+            <a:avLst/>
+          </a:prstGeom>
+        </p:spPr>
+        <p:txBody>
+          <a:bodyPr vert="horz" lIns="91440" tIns="45720" rIns="91440" bIns="45720" rtlCol="0" anchor="ctr">
+            <a:noAutofit/>
+          </a:bodyPr>
+          <a:lstStyle>
+            <a:lvl1pPr algn="ctr" defTabSz="457200" rtl="0" eaLnBrk="1" latinLnBrk="0" hangingPunct="1">
+              <a:spcBef>
+                <a:spcPct val="0"/>
+              </a:spcBef>
+              <a:buNone/>
+              <a:defRPr sz="4400" kern="1200">
+                <a:solidFill>
+                  <a:schemeClr val="tx1"/>
+                </a:solidFill>
+                <a:latin typeface="+mj-lt"/>
+                <a:ea typeface="+mj-ea"/>
+                <a:cs typeface="+mj-cs"/>
+              </a:defRPr>
+            </a:lvl1pPr>
+          </a:lstStyle>
+          <a:p>
+            <a:pPr algn="l"/>
+            <a:r>
+              <a:rPr lang="en-US" sz="2800" dirty="0" smtClean="0">
+                <a:solidFill>
+                  <a:schemeClr val="tx1">
+                    <a:lumMod val="95000"/>
+                    <a:lumOff val="5000"/>
+                  </a:schemeClr>
+                </a:solidFill>
+              </a:rPr>
+              <a:t>Normal Users</a:t>
+            </a:r>
+            <a:endParaRPr lang="en-US" sz="2800" dirty="0">
+              <a:solidFill>
+                <a:schemeClr val="tx1">
+                  <a:lumMod val="95000"/>
+                  <a:lumOff val="5000"/>
+                </a:schemeClr>
+              </a:solidFill>
+            </a:endParaRPr>
+          </a:p>
+        </p:txBody>
+      </p:sp>
+      <p:sp>
+        <p:nvSpPr>
+          <p:cNvPr id="17" name="Rectangle 16"/>
+          <p:cNvSpPr/>
+          <p:nvPr/>
+        </p:nvSpPr>
+        <p:spPr>
+          <a:xfrm>
+            <a:off x="438727" y="1346489"/>
+            <a:ext cx="3671455" cy="3867727"/>
+          </a:xfrm>
+          <a:prstGeom prst="rect">
+            <a:avLst/>
+          </a:prstGeom>
+          <a:noFill/>
+          <a:ln>
+            <a:solidFill>
+              <a:srgbClr val="262626"/>
+            </a:solidFill>
+          </a:ln>
+        </p:spPr>
+        <p:style>
+          <a:lnRef idx="1">
+            <a:schemeClr val="accent1"/>
+          </a:lnRef>
+          <a:fillRef idx="3">
+            <a:schemeClr val="accent1"/>
+          </a:fillRef>
+          <a:effectRef idx="2">
+            <a:schemeClr val="accent1"/>
+          </a:effectRef>
+          <a:fontRef idx="minor">
+            <a:schemeClr val="lt1"/>
+          </a:fontRef>
+        </p:style>
+        <p:txBody>
+          <a:bodyPr rtlCol="0" anchor="ctr"/>
+          <a:lstStyle/>
+          <a:p>
+            <a:pPr algn="ctr"/>
+            <a:endParaRPr lang="en-US"/>
+          </a:p>
+        </p:txBody>
+      </p:sp>
+      <p:sp>
+        <p:nvSpPr>
+          <p:cNvPr id="18" name="Rectangle 17"/>
+          <p:cNvSpPr/>
+          <p:nvPr/>
+        </p:nvSpPr>
+        <p:spPr>
+          <a:xfrm>
+            <a:off x="4264891" y="1346489"/>
+            <a:ext cx="4451927" cy="3867727"/>
+          </a:xfrm>
+          <a:prstGeom prst="rect">
+            <a:avLst/>
+          </a:prstGeom>
+          <a:noFill/>
+          <a:ln>
+            <a:solidFill>
+              <a:srgbClr val="262626"/>
+            </a:solidFill>
+          </a:ln>
+        </p:spPr>
+        <p:style>
+          <a:lnRef idx="1">
+            <a:schemeClr val="accent1"/>
+          </a:lnRef>
+          <a:fillRef idx="3">
+            <a:schemeClr val="accent1"/>
+          </a:fillRef>
+          <a:effectRef idx="2">
+            <a:schemeClr val="accent1"/>
+          </a:effectRef>
+          <a:fontRef idx="minor">
+            <a:schemeClr val="lt1"/>
+          </a:fontRef>
+        </p:style>
+        <p:txBody>
+          <a:bodyPr rtlCol="0" anchor="ctr"/>
+          <a:lstStyle/>
+          <a:p>
+            <a:pPr algn="ctr"/>
+            <a:endParaRPr lang="en-US"/>
+          </a:p>
+        </p:txBody>
+      </p:sp>
+      <p:sp>
+        <p:nvSpPr>
+          <p:cNvPr id="19" name="TextBox 18"/>
+          <p:cNvSpPr txBox="1"/>
+          <p:nvPr/>
+        </p:nvSpPr>
+        <p:spPr>
+          <a:xfrm>
+            <a:off x="1115300" y="2434122"/>
+            <a:ext cx="2636975" cy="369332"/>
+          </a:xfrm>
+          <a:prstGeom prst="rect">
+            <a:avLst/>
+          </a:prstGeom>
+          <a:noFill/>
+        </p:spPr>
+        <p:txBody>
+          <a:bodyPr wrap="square" rtlCol="0">
+            <a:spAutoFit/>
+          </a:bodyPr>
+          <a:lstStyle/>
+          <a:p>
+            <a:r>
+              <a:rPr lang="en-US" dirty="0" smtClean="0"/>
+              <a:t>Orange Banner: Admin</a:t>
+            </a:r>
+            <a:endParaRPr lang="en-US" dirty="0"/>
+          </a:p>
+        </p:txBody>
+      </p:sp>
+      <p:sp>
+        <p:nvSpPr>
+          <p:cNvPr id="20" name="TextBox 19"/>
+          <p:cNvSpPr txBox="1"/>
+          <p:nvPr/>
+        </p:nvSpPr>
+        <p:spPr>
+          <a:xfrm>
+            <a:off x="1138390" y="3242292"/>
+            <a:ext cx="2854446" cy="369332"/>
+          </a:xfrm>
+          <a:prstGeom prst="rect">
+            <a:avLst/>
+          </a:prstGeom>
+          <a:noFill/>
+        </p:spPr>
+        <p:txBody>
+          <a:bodyPr wrap="square" rtlCol="0">
+            <a:spAutoFit/>
+          </a:bodyPr>
+          <a:lstStyle/>
+          <a:p>
+            <a:r>
+              <a:rPr lang="en-US" dirty="0" smtClean="0"/>
+              <a:t>Yellow Star: Moderator</a:t>
+            </a:r>
+            <a:endParaRPr lang="en-US" dirty="0"/>
+          </a:p>
+        </p:txBody>
+      </p:sp>
+      <p:sp>
+        <p:nvSpPr>
+          <p:cNvPr id="21" name="TextBox 20"/>
+          <p:cNvSpPr txBox="1"/>
+          <p:nvPr/>
+        </p:nvSpPr>
+        <p:spPr>
+          <a:xfrm>
+            <a:off x="4939156" y="2468811"/>
+            <a:ext cx="3442844" cy="369332"/>
+          </a:xfrm>
+          <a:prstGeom prst="rect">
+            <a:avLst/>
+          </a:prstGeom>
+          <a:noFill/>
+        </p:spPr>
+        <p:txBody>
+          <a:bodyPr wrap="square" rtlCol="0">
+            <a:spAutoFit/>
+          </a:bodyPr>
+          <a:lstStyle/>
+          <a:p>
+            <a:r>
+              <a:rPr lang="en-US" dirty="0" smtClean="0"/>
+              <a:t>Person: New User (&lt; 10 posts)</a:t>
+            </a:r>
+            <a:endParaRPr lang="en-US" dirty="0"/>
+          </a:p>
+        </p:txBody>
+      </p:sp>
+      <p:sp>
+        <p:nvSpPr>
+          <p:cNvPr id="22" name="TextBox 21"/>
+          <p:cNvSpPr txBox="1"/>
+          <p:nvPr/>
+        </p:nvSpPr>
+        <p:spPr>
+          <a:xfrm>
+            <a:off x="4984180" y="3260798"/>
+            <a:ext cx="3442844" cy="369332"/>
+          </a:xfrm>
+          <a:prstGeom prst="rect">
+            <a:avLst/>
+          </a:prstGeom>
+          <a:noFill/>
+        </p:spPr>
+        <p:txBody>
+          <a:bodyPr wrap="square" rtlCol="0">
+            <a:spAutoFit/>
+          </a:bodyPr>
+          <a:lstStyle/>
+          <a:p>
+            <a:r>
+              <a:rPr lang="en-US" dirty="0" smtClean="0"/>
+              <a:t>Coffee: Average User (&gt; 10 posts)</a:t>
+            </a:r>
+            <a:endParaRPr lang="en-US" dirty="0"/>
+          </a:p>
+        </p:txBody>
+      </p:sp>
+      <p:sp>
+        <p:nvSpPr>
+          <p:cNvPr id="23" name="TextBox 22"/>
+          <p:cNvSpPr txBox="1"/>
+          <p:nvPr/>
+        </p:nvSpPr>
+        <p:spPr>
+          <a:xfrm>
+            <a:off x="4999196" y="4077022"/>
+            <a:ext cx="3442844" cy="369332"/>
+          </a:xfrm>
+          <a:prstGeom prst="rect">
+            <a:avLst/>
+          </a:prstGeom>
+          <a:noFill/>
+        </p:spPr>
+        <p:txBody>
+          <a:bodyPr wrap="square" rtlCol="0">
+            <a:spAutoFit/>
+          </a:bodyPr>
+          <a:lstStyle/>
+          <a:p>
+            <a:r>
+              <a:rPr lang="en-US" dirty="0" smtClean="0"/>
+              <a:t>Check Mark: Pro User (&gt; 100 posts)</a:t>
+            </a:r>
+            <a:endParaRPr lang="en-US" dirty="0"/>
+          </a:p>
+        </p:txBody>
+      </p:sp>
+      <p:sp>
+        <p:nvSpPr>
+          <p:cNvPr id="24" name="Title 1"/>
+          <p:cNvSpPr txBox="1">
+            <a:spLocks/>
+          </p:cNvSpPr>
+          <p:nvPr/>
+        </p:nvSpPr>
+        <p:spPr>
+          <a:xfrm>
+            <a:off x="1" y="0"/>
+            <a:ext cx="9144000" cy="1019092"/>
+          </a:xfrm>
+          <a:prstGeom prst="rect">
+            <a:avLst/>
+          </a:prstGeom>
+          <a:solidFill>
+            <a:srgbClr val="4EC5C1"/>
+          </a:solidFill>
+        </p:spPr>
+        <p:txBody>
+          <a:bodyPr vert="horz" lIns="91440" tIns="45720" rIns="91440" bIns="45720" rtlCol="0" anchor="ctr">
+            <a:noAutofit/>
+          </a:bodyPr>
+          <a:lstStyle>
+            <a:lvl1pPr algn="ctr" defTabSz="457200" rtl="0" eaLnBrk="1" latinLnBrk="0" hangingPunct="1">
+              <a:spcBef>
+                <a:spcPct val="0"/>
+              </a:spcBef>
+              <a:buNone/>
+              <a:defRPr sz="4400" kern="1200">
+                <a:solidFill>
+                  <a:schemeClr val="tx1"/>
+                </a:solidFill>
+                <a:latin typeface="+mj-lt"/>
+                <a:ea typeface="+mj-ea"/>
+                <a:cs typeface="+mj-cs"/>
+              </a:defRPr>
+            </a:lvl1pPr>
+          </a:lstStyle>
+          <a:p>
+            <a:r>
+              <a:rPr lang="en-US" sz="4800" dirty="0" smtClean="0">
+                <a:solidFill>
+                  <a:schemeClr val="bg1"/>
+                </a:solidFill>
+              </a:rPr>
+              <a:t>USER LEVELS</a:t>
+            </a:r>
+            <a:endParaRPr lang="en-US" sz="4800" dirty="0">
+              <a:solidFill>
+                <a:schemeClr val="bg1"/>
+              </a:solidFill>
+            </a:endParaRPr>
+          </a:p>
+        </p:txBody>
+      </p:sp>
     </p:spTree>
     <p:extLst>
       <p:ext uri="{BB962C8B-B14F-4D97-AF65-F5344CB8AC3E}">
-        <p14:creationId xmlns:p14="http://schemas.microsoft.com/office/powerpoint/2010/main" val="4186850539"/>
+        <p14:creationId xmlns:p14="http://schemas.microsoft.com/office/powerpoint/2010/main" val="3794599347"/>
       </p:ext>
     </p:extLst>
   </p:cSld>
@@ -4223,83 +5156,7 @@
   <p:timing>
     <p:tnLst>
       <p:par>
-        <p:cTn xmlns:p14="http://schemas.microsoft.com/office/powerpoint/2010/main" id="1" dur="indefinite" restart="never" nodeType="tmRoot">
-          <p:childTnLst>
-            <p:seq concurrent="1" nextAc="seek">
-              <p:cTn id="2" dur="indefinite" nodeType="mainSeq">
-                <p:childTnLst>
-                  <p:par>
-                    <p:cTn id="3" fill="hold">
-                      <p:stCondLst>
-                        <p:cond delay="indefinite"/>
-                      </p:stCondLst>
-                      <p:childTnLst>
-                        <p:par>
-                          <p:cTn id="4" fill="hold">
-                            <p:stCondLst>
-                              <p:cond delay="0"/>
-                            </p:stCondLst>
-                            <p:childTnLst>
-                              <p:par>
-                                <p:cTn id="5" presetID="10" presetClass="entr" presetSubtype="0" fill="hold" nodeType="clickEffect">
-                                  <p:stCondLst>
-                                    <p:cond delay="0"/>
-                                  </p:stCondLst>
-                                  <p:childTnLst>
-                                    <p:set>
-                                      <p:cBhvr>
-                                        <p:cTn id="6" dur="1" fill="hold">
-                                          <p:stCondLst>
-                                            <p:cond delay="0"/>
-                                          </p:stCondLst>
-                                        </p:cTn>
-                                        <p:tgtEl>
-                                          <p:spTgt spid="4"/>
-                                        </p:tgtEl>
-                                        <p:attrNameLst>
-                                          <p:attrName>style.visibility</p:attrName>
-                                        </p:attrNameLst>
-                                      </p:cBhvr>
-                                      <p:to>
-                                        <p:strVal val="visible"/>
-                                      </p:to>
-                                    </p:set>
-                                    <p:animEffect transition="in" filter="fade">
-                                      <p:cBhvr>
-                                        <p:cTn id="7" dur="500"/>
-                                        <p:tgtEl>
-                                          <p:spTgt spid="4"/>
-                                        </p:tgtEl>
-                                      </p:cBhvr>
-                                    </p:animEffect>
-                                  </p:childTnLst>
-                                </p:cTn>
-                              </p:par>
-                            </p:childTnLst>
-                          </p:cTn>
-                        </p:par>
-                      </p:childTnLst>
-                    </p:cTn>
-                  </p:par>
-                </p:childTnLst>
-              </p:cTn>
-              <p:prevCondLst>
-                <p:cond evt="onPrev" delay="0">
-                  <p:tgtEl>
-                    <p:sldTgt/>
-                  </p:tgtEl>
-                </p:cond>
-              </p:prevCondLst>
-              <p:nextCondLst>
-                <p:cond evt="onNext" delay="0">
-                  <p:tgtEl>
-                    <p:sldTgt/>
-                  </p:tgtEl>
-                </p:cond>
-              </p:nextCondLst>
-            </p:seq>
-          </p:childTnLst>
-        </p:cTn>
+        <p:cTn xmlns:p14="http://schemas.microsoft.com/office/powerpoint/2010/main" id="1" dur="indefinite" restart="never" nodeType="tmRoot"/>
       </p:par>
     </p:tnLst>
   </p:timing>
@@ -4325,76 +5182,131 @@
       </p:grpSpPr>
       <p:sp>
         <p:nvSpPr>
-          <p:cNvPr id="2" name="Title 1"/>
-          <p:cNvSpPr>
-            <a:spLocks noGrp="1"/>
-          </p:cNvSpPr>
-          <p:nvPr>
-            <p:ph type="title"/>
-          </p:nvPr>
-        </p:nvSpPr>
-        <p:spPr>
-          <a:xfrm>
-            <a:off x="457200" y="2835276"/>
-            <a:ext cx="8229600" cy="1143000"/>
-          </a:xfrm>
-        </p:spPr>
-        <p:txBody>
-          <a:bodyPr>
-            <a:normAutofit fontScale="90000"/>
-          </a:bodyPr>
-          <a:lstStyle/>
-          <a:p>
-            <a:r>
-              <a:rPr lang="en-US" sz="9800" dirty="0" smtClean="0">
-                <a:solidFill>
-                  <a:srgbClr val="4EC5C1"/>
-                </a:solidFill>
-              </a:rPr>
-              <a:t>PAGINATION</a:t>
-            </a:r>
-            <a:endParaRPr lang="en-US" dirty="0">
-              <a:solidFill>
-                <a:srgbClr val="4EC5C1"/>
-              </a:solidFill>
-            </a:endParaRPr>
-          </a:p>
-        </p:txBody>
-      </p:sp>
-      <p:pic>
-        <p:nvPicPr>
-          <p:cNvPr id="4" name="Picture 3" descr="mockup5.png"/>
-          <p:cNvPicPr>
-            <a:picLocks noChangeAspect="1"/>
-          </p:cNvPicPr>
+          <p:cNvPr id="3" name="Content Placeholder 2"/>
+          <p:cNvSpPr>
+            <a:spLocks noGrp="1"/>
+          </p:cNvSpPr>
+          <p:nvPr>
+            <p:ph idx="1"/>
+          </p:nvPr>
+        </p:nvSpPr>
+        <p:spPr>
+          <a:xfrm>
+            <a:off x="457200" y="1397000"/>
+            <a:ext cx="8229600" cy="4729163"/>
+          </a:xfrm>
+        </p:spPr>
+        <p:txBody>
+          <a:bodyPr/>
+          <a:lstStyle/>
+          <a:p>
+            <a:r>
+              <a:rPr lang="en-US" dirty="0" smtClean="0"/>
+              <a:t>Admin/Mod: Freeze Board</a:t>
+            </a:r>
+          </a:p>
+          <a:p>
+            <a:r>
+              <a:rPr lang="en-US" dirty="0" smtClean="0"/>
+              <a:t>Admin/Mod: Edit Posts</a:t>
+            </a:r>
+          </a:p>
+          <a:p>
+            <a:r>
+              <a:rPr lang="en-US" dirty="0" smtClean="0"/>
+              <a:t>Admin/Mod: Suspend and </a:t>
+            </a:r>
+            <a:r>
+              <a:rPr lang="en-US" dirty="0" err="1" smtClean="0"/>
+              <a:t>Unsuspend</a:t>
+            </a:r>
+            <a:r>
+              <a:rPr lang="en-US" dirty="0" smtClean="0"/>
+              <a:t> Users</a:t>
+            </a:r>
+          </a:p>
+          <a:p>
+            <a:r>
+              <a:rPr lang="en-US" dirty="0" smtClean="0"/>
+              <a:t>Admin: Overview of Users’ Stats</a:t>
+            </a:r>
+          </a:p>
+          <a:p>
+            <a:r>
+              <a:rPr lang="en-US" dirty="0" smtClean="0"/>
+              <a:t>Admin: Delete Users</a:t>
+            </a:r>
+          </a:p>
+          <a:p>
+            <a:r>
+              <a:rPr lang="en-US" dirty="0" smtClean="0"/>
+              <a:t>SQL: Prevent SQL injection attack</a:t>
+            </a:r>
+            <a:endParaRPr lang="en-US" dirty="0"/>
+          </a:p>
+        </p:txBody>
+      </p:sp>
+      <p:sp>
+        <p:nvSpPr>
+          <p:cNvPr id="4" name="Title 1"/>
+          <p:cNvSpPr txBox="1">
+            <a:spLocks/>
+          </p:cNvSpPr>
           <p:nvPr/>
-        </p:nvPicPr>
-        <p:blipFill>
-          <a:blip r:embed="rId2">
-            <a:extLst>
-              <a:ext uri="{28A0092B-C50C-407E-A947-70E740481C1C}">
-                <a14:useLocalDpi xmlns:a14="http://schemas.microsoft.com/office/drawing/2010/main" val="0"/>
-              </a:ext>
-            </a:extLst>
-          </a:blip>
-          <a:stretch>
-            <a:fillRect/>
-          </a:stretch>
-        </p:blipFill>
-        <p:spPr>
-          <a:xfrm>
-            <a:off x="0" y="0"/>
-            <a:ext cx="9144000" cy="6858000"/>
+        </p:nvSpPr>
+        <p:spPr>
+          <a:xfrm>
+            <a:off x="1" y="0"/>
+            <a:ext cx="9144000" cy="1019092"/>
           </a:xfrm>
           <a:prstGeom prst="rect">
             <a:avLst/>
           </a:prstGeom>
-        </p:spPr>
-      </p:pic>
+          <a:solidFill>
+            <a:srgbClr val="4EC5C1"/>
+          </a:solidFill>
+        </p:spPr>
+        <p:txBody>
+          <a:bodyPr vert="horz" lIns="91440" tIns="45720" rIns="91440" bIns="45720" rtlCol="0" anchor="ctr">
+            <a:noAutofit/>
+          </a:bodyPr>
+          <a:lstStyle>
+            <a:lvl1pPr algn="ctr" defTabSz="457200" rtl="0" eaLnBrk="1" latinLnBrk="0" hangingPunct="1">
+              <a:spcBef>
+                <a:spcPct val="0"/>
+              </a:spcBef>
+              <a:buNone/>
+              <a:defRPr sz="4400" kern="1200">
+                <a:solidFill>
+                  <a:schemeClr val="tx1"/>
+                </a:solidFill>
+                <a:latin typeface="+mj-lt"/>
+                <a:ea typeface="+mj-ea"/>
+                <a:cs typeface="+mj-cs"/>
+              </a:defRPr>
+            </a:lvl1pPr>
+          </a:lstStyle>
+          <a:p>
+            <a:r>
+              <a:rPr lang="en-US" sz="4800" dirty="0" smtClean="0">
+                <a:solidFill>
+                  <a:schemeClr val="bg1"/>
+                </a:solidFill>
+              </a:rPr>
+              <a:t>Unimplemented Features</a:t>
+            </a:r>
+            <a:endParaRPr lang="en-US" sz="4800" dirty="0">
+              <a:solidFill>
+                <a:schemeClr val="bg1"/>
+              </a:solidFill>
+            </a:endParaRPr>
+          </a:p>
+        </p:txBody>
+      </p:sp>
     </p:spTree>
     <p:extLst>
       <p:ext uri="{BB962C8B-B14F-4D97-AF65-F5344CB8AC3E}">
-        <p14:creationId xmlns:p14="http://schemas.microsoft.com/office/powerpoint/2010/main" val="517973657"/>
+        <p14:creationId xmlns:p14="http://schemas.microsoft.com/office/powerpoint/2010/main" val="2912195200"/>
       </p:ext>
     </p:extLst>
   </p:cSld>
@@ -4404,83 +5316,7 @@
   <p:timing>
     <p:tnLst>
       <p:par>
-        <p:cTn xmlns:p14="http://schemas.microsoft.com/office/powerpoint/2010/main" id="1" dur="indefinite" restart="never" nodeType="tmRoot">
-          <p:childTnLst>
-            <p:seq concurrent="1" nextAc="seek">
-              <p:cTn id="2" dur="indefinite" nodeType="mainSeq">
-                <p:childTnLst>
-                  <p:par>
-                    <p:cTn id="3" fill="hold">
-                      <p:stCondLst>
-                        <p:cond delay="indefinite"/>
-                      </p:stCondLst>
-                      <p:childTnLst>
-                        <p:par>
-                          <p:cTn id="4" fill="hold">
-                            <p:stCondLst>
-                              <p:cond delay="0"/>
-                            </p:stCondLst>
-                            <p:childTnLst>
-                              <p:par>
-                                <p:cTn id="5" presetID="10" presetClass="entr" presetSubtype="0" fill="hold" nodeType="clickEffect">
-                                  <p:stCondLst>
-                                    <p:cond delay="0"/>
-                                  </p:stCondLst>
-                                  <p:childTnLst>
-                                    <p:set>
-                                      <p:cBhvr>
-                                        <p:cTn id="6" dur="1" fill="hold">
-                                          <p:stCondLst>
-                                            <p:cond delay="0"/>
-                                          </p:stCondLst>
-                                        </p:cTn>
-                                        <p:tgtEl>
-                                          <p:spTgt spid="4"/>
-                                        </p:tgtEl>
-                                        <p:attrNameLst>
-                                          <p:attrName>style.visibility</p:attrName>
-                                        </p:attrNameLst>
-                                      </p:cBhvr>
-                                      <p:to>
-                                        <p:strVal val="visible"/>
-                                      </p:to>
-                                    </p:set>
-                                    <p:animEffect transition="in" filter="fade">
-                                      <p:cBhvr>
-                                        <p:cTn id="7" dur="500"/>
-                                        <p:tgtEl>
-                                          <p:spTgt spid="4"/>
-                                        </p:tgtEl>
-                                      </p:cBhvr>
-                                    </p:animEffect>
-                                  </p:childTnLst>
-                                </p:cTn>
-                              </p:par>
-                            </p:childTnLst>
-                          </p:cTn>
-                        </p:par>
-                      </p:childTnLst>
-                    </p:cTn>
-                  </p:par>
-                </p:childTnLst>
-              </p:cTn>
-              <p:prevCondLst>
-                <p:cond evt="onPrev" delay="0">
-                  <p:tgtEl>
-                    <p:sldTgt/>
-                  </p:tgtEl>
-                </p:cond>
-              </p:prevCondLst>
-              <p:nextCondLst>
-                <p:cond evt="onNext" delay="0">
-                  <p:tgtEl>
-                    <p:sldTgt/>
-                  </p:tgtEl>
-                </p:cond>
-              </p:nextCondLst>
-            </p:seq>
-          </p:childTnLst>
-        </p:cTn>
+        <p:cTn xmlns:p14="http://schemas.microsoft.com/office/powerpoint/2010/main" id="1" dur="indefinite" restart="never" nodeType="tmRoot"/>
       </p:par>
     </p:tnLst>
   </p:timing>

</xml_diff>